<commit_message>
Added Text to People
</commit_message>
<xml_diff>
--- a/People Section.pptx
+++ b/People Section.pptx
@@ -2991,11 +2991,7 @@
             </a:r>
             <a:r>
               <a:rPr lang="en-US" dirty="0" smtClean="0"/>
-              <a:t> </a:t>
-            </a:r>
-            <a:r>
-              <a:rPr lang="en-US" dirty="0" smtClean="0"/>
-              <a:t>Stuff</a:t>
+              <a:t> Stuff</a:t>
             </a:r>
             <a:endParaRPr lang="en-US" dirty="0"/>
           </a:p>
@@ -3030,6 +3026,13 @@
   <p:clrMapOvr>
     <a:masterClrMapping/>
   </p:clrMapOvr>
+  <p:timing>
+    <p:tnLst>
+      <p:par>
+        <p:cTn id="1" dur="indefinite" restart="never" nodeType="tmRoot"/>
+      </p:par>
+    </p:tnLst>
+  </p:timing>
 </p:sld>
 </file>
 
@@ -3066,14 +3069,18 @@
           <a:lstStyle/>
           <a:p>
             <a:r>
-              <a:rPr lang="en-US" dirty="0" err="1" smtClean="0"/>
-              <a:t>Shyma’s</a:t>
-            </a:r>
-            <a:r>
-              <a:rPr lang="en-US" smtClean="0"/>
-              <a:t> Stuff</a:t>
-            </a:r>
-            <a:endParaRPr lang="en-US"/>
+              <a:rPr lang="en-US" smtClean="0"/>
+              <a:t>Shymaaaa’s</a:t>
+            </a:r>
+            <a:r>
+              <a:rPr lang="en-US" dirty="0" smtClean="0"/>
+              <a:t> </a:t>
+            </a:r>
+            <a:r>
+              <a:rPr lang="en-US" dirty="0" smtClean="0"/>
+              <a:t>Stuff</a:t>
+            </a:r>
+            <a:endParaRPr lang="en-US" dirty="0"/>
           </a:p>
         </p:txBody>
       </p:sp>
@@ -3106,6 +3113,13 @@
   <p:clrMapOvr>
     <a:masterClrMapping/>
   </p:clrMapOvr>
+  <p:timing>
+    <p:tnLst>
+      <p:par>
+        <p:cTn id="1" dur="indefinite" restart="never" nodeType="tmRoot"/>
+      </p:par>
+    </p:tnLst>
+  </p:timing>
 </p:sld>
 </file>
 

</xml_diff>